<commit_message>
Finished project sin Presentation
</commit_message>
<xml_diff>
--- a/Pressure_Prediction_Project/PressPredProjPres.pptx
+++ b/Pressure_Prediction_Project/PressPredProjPres.pptx
@@ -7,9 +7,13 @@
   <p:sldIdLst>
     <p:sldId id="256" r:id="rId2"/>
     <p:sldId id="257" r:id="rId3"/>
-    <p:sldId id="258" r:id="rId4"/>
-    <p:sldId id="259" r:id="rId5"/>
-    <p:sldId id="260" r:id="rId6"/>
+    <p:sldId id="261" r:id="rId4"/>
+    <p:sldId id="262" r:id="rId5"/>
+    <p:sldId id="263" r:id="rId6"/>
+    <p:sldId id="258" r:id="rId7"/>
+    <p:sldId id="264" r:id="rId8"/>
+    <p:sldId id="259" r:id="rId9"/>
+    <p:sldId id="260" r:id="rId10"/>
   </p:sldIdLst>
   <p:sldSz cx="12192000" cy="6858000"/>
   <p:notesSz cx="6858000" cy="9144000"/>
@@ -108,6 +112,11 @@
       </a:defRPr>
     </a:lvl9pPr>
   </p:defaultTextStyle>
+  <p:extLst>
+    <p:ext uri="{EFAFB233-063F-42B5-8137-9DF3F51BA10A}">
+      <p15:sldGuideLst xmlns:p15="http://schemas.microsoft.com/office/powerpoint/2012/main"/>
+    </p:ext>
+  </p:extLst>
 </p:presentation>
 </file>
 
@@ -258,7 +267,7 @@
           <a:p>
             <a:fld id="{073D55F9-11A3-4523-8F38-6BA37933791A}" type="datetime1">
               <a:rPr lang="en-US" smtClean="0"/>
-              <a:t>4/7/2025</a:t>
+              <a:t>4/14/2025</a:t>
             </a:fld>
             <a:endParaRPr lang="en-US"/>
           </a:p>
@@ -459,7 +468,7 @@
           <a:p>
             <a:fld id="{0B4E757A-3EC2-4683-9080-1A460C37C843}" type="datetime1">
               <a:rPr lang="en-US" smtClean="0"/>
-              <a:t>4/7/2025</a:t>
+              <a:t>4/14/2025</a:t>
             </a:fld>
             <a:endParaRPr lang="en-US"/>
           </a:p>
@@ -670,7 +679,7 @@
           <a:p>
             <a:fld id="{5CC8096C-64ED-4153-A483-5C02E44AD5C3}" type="datetime1">
               <a:rPr lang="en-US" smtClean="0"/>
-              <a:t>4/7/2025</a:t>
+              <a:t>4/14/2025</a:t>
             </a:fld>
             <a:endParaRPr lang="en-US" dirty="0"/>
           </a:p>
@@ -871,7 +880,7 @@
           <a:p>
             <a:fld id="{1CB9D56B-6EBE-4E5F-99D9-2A3DBDF37D0A}" type="datetime1">
               <a:rPr lang="en-US" smtClean="0"/>
-              <a:t>4/7/2025</a:t>
+              <a:t>4/14/2025</a:t>
             </a:fld>
             <a:endParaRPr lang="en-US"/>
           </a:p>
@@ -1149,7 +1158,7 @@
           <a:p>
             <a:fld id="{8C33F3CA-C7E3-432D-9282-18F13836509A}" type="datetime1">
               <a:rPr lang="en-US" smtClean="0"/>
-              <a:t>4/7/2025</a:t>
+              <a:t>4/14/2025</a:t>
             </a:fld>
             <a:endParaRPr lang="en-US" dirty="0"/>
           </a:p>
@@ -1417,7 +1426,7 @@
           <a:p>
             <a:fld id="{75BE9C62-1337-40B8-BA50-E9F4861DB4BC}" type="datetime1">
               <a:rPr lang="en-US" smtClean="0"/>
-              <a:t>4/7/2025</a:t>
+              <a:t>4/14/2025</a:t>
             </a:fld>
             <a:endParaRPr lang="en-US"/>
           </a:p>
@@ -1832,7 +1841,7 @@
           <a:p>
             <a:fld id="{47C195EB-2DA3-4B24-8725-19BC22A7BE50}" type="datetime1">
               <a:rPr lang="en-US" smtClean="0"/>
-              <a:t>4/7/2025</a:t>
+              <a:t>4/14/2025</a:t>
             </a:fld>
             <a:endParaRPr lang="en-US"/>
           </a:p>
@@ -1976,7 +1985,7 @@
           <a:p>
             <a:fld id="{F4E237E6-0076-4915-A5A8-B7C11FA4F374}" type="datetime1">
               <a:rPr lang="en-US" smtClean="0"/>
-              <a:t>4/7/2025</a:t>
+              <a:t>4/14/2025</a:t>
             </a:fld>
             <a:endParaRPr lang="en-US"/>
           </a:p>
@@ -2092,7 +2101,7 @@
           <a:p>
             <a:fld id="{3505F58F-C0B5-422A-8E5A-6B99E5D80F0A}" type="datetime1">
               <a:rPr lang="en-US" smtClean="0"/>
-              <a:t>4/7/2025</a:t>
+              <a:t>4/14/2025</a:t>
             </a:fld>
             <a:endParaRPr lang="en-US"/>
           </a:p>
@@ -2406,7 +2415,7 @@
           <a:p>
             <a:fld id="{7565E655-9687-48DF-A33F-F8824CCCB5D1}" type="datetime1">
               <a:rPr lang="en-US" smtClean="0"/>
-              <a:t>4/7/2025</a:t>
+              <a:t>4/14/2025</a:t>
             </a:fld>
             <a:endParaRPr lang="en-US"/>
           </a:p>
@@ -2697,7 +2706,7 @@
           <a:p>
             <a:fld id="{B97FD56A-AAB8-4544-A495-D0645413C9E3}" type="datetime1">
               <a:rPr lang="en-US" smtClean="0"/>
-              <a:t>4/7/2025</a:t>
+              <a:t>4/14/2025</a:t>
             </a:fld>
             <a:endParaRPr lang="en-US"/>
           </a:p>
@@ -2942,7 +2951,7 @@
             <a:fld id="{193BAB95-8DA7-460B-B00A-7037C8394FB0}" type="datetime1">
               <a:rPr lang="en-US" smtClean="0"/>
               <a:pPr/>
-              <a:t>4/7/2025</a:t>
+              <a:t>4/14/2025</a:t>
             </a:fld>
             <a:endParaRPr lang="en-US" dirty="0"/>
           </a:p>
@@ -3442,7 +3451,7 @@
                   <a:schemeClr val="tx2"/>
                 </a:solidFill>
               </a:rPr>
-              <a:t>Pressure Prediction with A Convolutional Neural Net</a:t>
+              <a:t>Pressure Prediction by a Convolutional Neural Net</a:t>
             </a:r>
           </a:p>
         </p:txBody>
@@ -3655,7 +3664,7 @@
           <p:cNvPr id="2" name="Title 1">
             <a:extLst>
               <a:ext uri="{FF2B5EF4-FFF2-40B4-BE49-F238E27FC236}">
-                <a16:creationId xmlns:a16="http://schemas.microsoft.com/office/drawing/2014/main" id="{93047FED-3A13-9BD2-C802-8D8C7F5C8F6F}"/>
+                <a16:creationId xmlns:a16="http://schemas.microsoft.com/office/drawing/2014/main" id="{F9EB7397-9C9E-435D-BDFA-261DF565688E}"/>
               </a:ext>
             </a:extLst>
           </p:cNvPr>
@@ -3673,50 +3682,146 @@
           <a:p>
             <a:r>
               <a:rPr lang="en-US" dirty="0"/>
-              <a:t>Methods</a:t>
-            </a:r>
-          </a:p>
-        </p:txBody>
-      </p:sp>
-      <p:sp>
-        <p:nvSpPr>
-          <p:cNvPr id="3" name="Content Placeholder 2">
-            <a:extLst>
-              <a:ext uri="{FF2B5EF4-FFF2-40B4-BE49-F238E27FC236}">
-                <a16:creationId xmlns:a16="http://schemas.microsoft.com/office/drawing/2014/main" id="{7F36BA33-4B95-D10D-D863-C44C04E95B3A}"/>
-              </a:ext>
-            </a:extLst>
-          </p:cNvPr>
-          <p:cNvSpPr>
-            <a:spLocks noGrp="1"/>
-          </p:cNvSpPr>
+              <a:t>Particle Image Velocimetry</a:t>
+            </a:r>
+          </a:p>
+        </p:txBody>
+      </p:sp>
+      <p:pic>
+        <p:nvPicPr>
+          <p:cNvPr id="4" name="Content Placeholder 3">
+            <a:extLst>
+              <a:ext uri="{FF2B5EF4-FFF2-40B4-BE49-F238E27FC236}">
+                <a16:creationId xmlns:a16="http://schemas.microsoft.com/office/drawing/2014/main" id="{55DE4195-F323-4E23-9D5A-337561432006}"/>
+              </a:ext>
+            </a:extLst>
+          </p:cNvPr>
+          <p:cNvPicPr>
+            <a:picLocks noGrp="1" noChangeAspect="1"/>
+          </p:cNvPicPr>
           <p:nvPr>
             <p:ph idx="1"/>
           </p:nvPr>
-        </p:nvSpPr>
-        <p:spPr/>
-        <p:txBody>
-          <a:bodyPr/>
-          <a:lstStyle/>
-          <a:p>
-            <a:r>
-              <a:rPr lang="en-US" b="0" i="0" dirty="0">
-                <a:solidFill>
-                  <a:srgbClr val="515151"/>
-                </a:solidFill>
-                <a:effectLst/>
-                <a:latin typeface="Palatino Linotype" panose="02040502050505030304" pitchFamily="18" charset="0"/>
-              </a:rPr>
-              <a:t>Uses appropriate methods and best practices. Explains approach with technical rigor (e.g., model architecture, loss functions, training details).</a:t>
-            </a:r>
-            <a:endParaRPr lang="en-US" dirty="0"/>
+        </p:nvPicPr>
+        <p:blipFill>
+          <a:blip r:embed="rId2"/>
+          <a:stretch>
+            <a:fillRect/>
+          </a:stretch>
+        </p:blipFill>
+        <p:spPr>
+          <a:xfrm>
+            <a:off x="3564701" y="1690688"/>
+            <a:ext cx="3690815" cy="2494482"/>
+          </a:xfrm>
+          <a:prstGeom prst="rect">
+            <a:avLst/>
+          </a:prstGeom>
+        </p:spPr>
+      </p:pic>
+      <p:pic>
+        <p:nvPicPr>
+          <p:cNvPr id="5" name="Picture 4">
+            <a:extLst>
+              <a:ext uri="{FF2B5EF4-FFF2-40B4-BE49-F238E27FC236}">
+                <a16:creationId xmlns:a16="http://schemas.microsoft.com/office/drawing/2014/main" id="{88FD0934-9A29-41AC-BC4B-FAC03C1DB948}"/>
+              </a:ext>
+            </a:extLst>
+          </p:cNvPr>
+          <p:cNvPicPr>
+            <a:picLocks noChangeAspect="1"/>
+          </p:cNvPicPr>
+          <p:nvPr/>
+        </p:nvPicPr>
+        <p:blipFill>
+          <a:blip r:embed="rId3"/>
+          <a:stretch>
+            <a:fillRect/>
+          </a:stretch>
+        </p:blipFill>
+        <p:spPr>
+          <a:xfrm>
+            <a:off x="7327613" y="1439565"/>
+            <a:ext cx="4639322" cy="4496427"/>
+          </a:xfrm>
+          <a:prstGeom prst="rect">
+            <a:avLst/>
+          </a:prstGeom>
+        </p:spPr>
+      </p:pic>
+      <p:sp>
+        <p:nvSpPr>
+          <p:cNvPr id="6" name="TextBox 5">
+            <a:extLst>
+              <a:ext uri="{FF2B5EF4-FFF2-40B4-BE49-F238E27FC236}">
+                <a16:creationId xmlns:a16="http://schemas.microsoft.com/office/drawing/2014/main" id="{5BFF785C-5A12-47C1-9F5D-296C6BD2F8E6}"/>
+              </a:ext>
+            </a:extLst>
+          </p:cNvPr>
+          <p:cNvSpPr txBox="1"/>
+          <p:nvPr/>
+        </p:nvSpPr>
+        <p:spPr>
+          <a:xfrm>
+            <a:off x="838200" y="2211572"/>
+            <a:ext cx="2654404" cy="3139321"/>
+          </a:xfrm>
+          <a:prstGeom prst="rect">
+            <a:avLst/>
+          </a:prstGeom>
+          <a:noFill/>
+        </p:spPr>
+        <p:txBody>
+          <a:bodyPr wrap="square" rtlCol="0">
+            <a:spAutoFit/>
+          </a:bodyPr>
+          <a:lstStyle/>
+          <a:p>
+            <a:pPr marL="285750" indent="-285750">
+              <a:buFont typeface="Arial" panose="020B0604020202020204" pitchFamily="34" charset="0"/>
+              <a:buChar char="•"/>
+            </a:pPr>
+            <a:r>
+              <a:rPr lang="en-US" dirty="0"/>
+              <a:t>A laser sheet is shined through a particle laden flow</a:t>
+            </a:r>
+          </a:p>
+          <a:p>
+            <a:pPr marL="285750" indent="-285750">
+              <a:buFont typeface="Arial" panose="020B0604020202020204" pitchFamily="34" charset="0"/>
+              <a:buChar char="•"/>
+            </a:pPr>
+            <a:r>
+              <a:rPr lang="en-US" dirty="0"/>
+              <a:t>Two highspeed images are taken in quick succession</a:t>
+            </a:r>
+          </a:p>
+          <a:p>
+            <a:pPr marL="285750" indent="-285750">
+              <a:buFont typeface="Arial" panose="020B0604020202020204" pitchFamily="34" charset="0"/>
+              <a:buChar char="•"/>
+            </a:pPr>
+            <a:r>
+              <a:rPr lang="en-US" dirty="0"/>
+              <a:t>A computer is used to track the particle movement and create a velocity field</a:t>
+            </a:r>
+          </a:p>
+          <a:p>
+            <a:pPr marL="285750" indent="-285750">
+              <a:buFont typeface="Arial" panose="020B0604020202020204" pitchFamily="34" charset="0"/>
+              <a:buChar char="•"/>
+            </a:pPr>
+            <a:r>
+              <a:rPr lang="en-US" dirty="0"/>
+              <a:t>No pressure data</a:t>
+            </a:r>
           </a:p>
         </p:txBody>
       </p:sp>
     </p:spTree>
     <p:extLst>
       <p:ext uri="{BB962C8B-B14F-4D97-AF65-F5344CB8AC3E}">
-        <p14:creationId xmlns:p14="http://schemas.microsoft.com/office/powerpoint/2010/main" val="2047516186"/>
+        <p14:creationId xmlns:p14="http://schemas.microsoft.com/office/powerpoint/2010/main" val="4290436971"/>
       </p:ext>
     </p:extLst>
   </p:cSld>
@@ -3748,6 +3853,729 @@
           <p:cNvPr id="2" name="Title 1">
             <a:extLst>
               <a:ext uri="{FF2B5EF4-FFF2-40B4-BE49-F238E27FC236}">
+                <a16:creationId xmlns:a16="http://schemas.microsoft.com/office/drawing/2014/main" id="{24B9DF47-24F0-421A-9FDF-8A9785735D46}"/>
+              </a:ext>
+            </a:extLst>
+          </p:cNvPr>
+          <p:cNvSpPr>
+            <a:spLocks noGrp="1"/>
+          </p:cNvSpPr>
+          <p:nvPr>
+            <p:ph type="title"/>
+          </p:nvPr>
+        </p:nvSpPr>
+        <p:spPr/>
+        <p:txBody>
+          <a:bodyPr/>
+          <a:lstStyle/>
+          <a:p>
+            <a:r>
+              <a:rPr lang="en-US" dirty="0"/>
+              <a:t>Relevant Literature</a:t>
+            </a:r>
+          </a:p>
+        </p:txBody>
+      </p:sp>
+      <p:pic>
+        <p:nvPicPr>
+          <p:cNvPr id="4" name="Picture 3">
+            <a:extLst>
+              <a:ext uri="{FF2B5EF4-FFF2-40B4-BE49-F238E27FC236}">
+                <a16:creationId xmlns:a16="http://schemas.microsoft.com/office/drawing/2014/main" id="{D46681EB-5633-483F-8783-19AC9D6231B2}"/>
+              </a:ext>
+            </a:extLst>
+          </p:cNvPr>
+          <p:cNvPicPr>
+            <a:picLocks noChangeAspect="1"/>
+          </p:cNvPicPr>
+          <p:nvPr/>
+        </p:nvPicPr>
+        <p:blipFill>
+          <a:blip r:embed="rId2"/>
+          <a:stretch>
+            <a:fillRect/>
+          </a:stretch>
+        </p:blipFill>
+        <p:spPr>
+          <a:xfrm>
+            <a:off x="20596" y="1513256"/>
+            <a:ext cx="4481406" cy="5344744"/>
+          </a:xfrm>
+          <a:prstGeom prst="rect">
+            <a:avLst/>
+          </a:prstGeom>
+        </p:spPr>
+      </p:pic>
+      <p:pic>
+        <p:nvPicPr>
+          <p:cNvPr id="5" name="Picture 4">
+            <a:extLst>
+              <a:ext uri="{FF2B5EF4-FFF2-40B4-BE49-F238E27FC236}">
+                <a16:creationId xmlns:a16="http://schemas.microsoft.com/office/drawing/2014/main" id="{0D33370E-CC79-4E7B-AB0E-0ACED9B46849}"/>
+              </a:ext>
+            </a:extLst>
+          </p:cNvPr>
+          <p:cNvPicPr>
+            <a:picLocks noChangeAspect="1"/>
+          </p:cNvPicPr>
+          <p:nvPr/>
+        </p:nvPicPr>
+        <p:blipFill>
+          <a:blip r:embed="rId3"/>
+          <a:stretch>
+            <a:fillRect/>
+          </a:stretch>
+        </p:blipFill>
+        <p:spPr>
+          <a:xfrm>
+            <a:off x="20596" y="5007266"/>
+            <a:ext cx="1850734" cy="1850734"/>
+          </a:xfrm>
+          <a:prstGeom prst="rect">
+            <a:avLst/>
+          </a:prstGeom>
+        </p:spPr>
+      </p:pic>
+      <p:pic>
+        <p:nvPicPr>
+          <p:cNvPr id="6" name="Picture 5">
+            <a:extLst>
+              <a:ext uri="{FF2B5EF4-FFF2-40B4-BE49-F238E27FC236}">
+                <a16:creationId xmlns:a16="http://schemas.microsoft.com/office/drawing/2014/main" id="{24AE9E11-9114-409B-8FA0-A103409AD7BD}"/>
+              </a:ext>
+            </a:extLst>
+          </p:cNvPr>
+          <p:cNvPicPr>
+            <a:picLocks noChangeAspect="1"/>
+          </p:cNvPicPr>
+          <p:nvPr/>
+        </p:nvPicPr>
+        <p:blipFill>
+          <a:blip r:embed="rId4"/>
+          <a:stretch>
+            <a:fillRect/>
+          </a:stretch>
+        </p:blipFill>
+        <p:spPr>
+          <a:xfrm>
+            <a:off x="8165805" y="1513256"/>
+            <a:ext cx="4026195" cy="5320772"/>
+          </a:xfrm>
+          <a:prstGeom prst="rect">
+            <a:avLst/>
+          </a:prstGeom>
+        </p:spPr>
+      </p:pic>
+      <p:pic>
+        <p:nvPicPr>
+          <p:cNvPr id="7" name="Picture 6">
+            <a:extLst>
+              <a:ext uri="{FF2B5EF4-FFF2-40B4-BE49-F238E27FC236}">
+                <a16:creationId xmlns:a16="http://schemas.microsoft.com/office/drawing/2014/main" id="{6A54A5F5-0CD2-4B4C-B2CC-FDAC35D94136}"/>
+              </a:ext>
+            </a:extLst>
+          </p:cNvPr>
+          <p:cNvPicPr>
+            <a:picLocks noChangeAspect="1"/>
+          </p:cNvPicPr>
+          <p:nvPr/>
+        </p:nvPicPr>
+        <p:blipFill>
+          <a:blip r:embed="rId5"/>
+          <a:stretch>
+            <a:fillRect/>
+          </a:stretch>
+        </p:blipFill>
+        <p:spPr>
+          <a:xfrm>
+            <a:off x="10341266" y="5007266"/>
+            <a:ext cx="1850734" cy="1850734"/>
+          </a:xfrm>
+          <a:prstGeom prst="rect">
+            <a:avLst/>
+          </a:prstGeom>
+        </p:spPr>
+      </p:pic>
+      <p:pic>
+        <p:nvPicPr>
+          <p:cNvPr id="8" name="Picture 7">
+            <a:extLst>
+              <a:ext uri="{FF2B5EF4-FFF2-40B4-BE49-F238E27FC236}">
+                <a16:creationId xmlns:a16="http://schemas.microsoft.com/office/drawing/2014/main" id="{C3037D20-7FCD-46E3-8571-E52AF3C22922}"/>
+              </a:ext>
+            </a:extLst>
+          </p:cNvPr>
+          <p:cNvPicPr>
+            <a:picLocks noChangeAspect="1"/>
+          </p:cNvPicPr>
+          <p:nvPr/>
+        </p:nvPicPr>
+        <p:blipFill>
+          <a:blip r:embed="rId6"/>
+          <a:stretch>
+            <a:fillRect/>
+          </a:stretch>
+        </p:blipFill>
+        <p:spPr>
+          <a:xfrm>
+            <a:off x="4646538" y="2200275"/>
+            <a:ext cx="3374730" cy="3374730"/>
+          </a:xfrm>
+          <a:prstGeom prst="rect">
+            <a:avLst/>
+          </a:prstGeom>
+        </p:spPr>
+      </p:pic>
+      <p:sp>
+        <p:nvSpPr>
+          <p:cNvPr id="9" name="TextBox 8">
+            <a:extLst>
+              <a:ext uri="{FF2B5EF4-FFF2-40B4-BE49-F238E27FC236}">
+                <a16:creationId xmlns:a16="http://schemas.microsoft.com/office/drawing/2014/main" id="{D509A53C-AA4F-4FB2-8D01-5224801C098F}"/>
+              </a:ext>
+            </a:extLst>
+          </p:cNvPr>
+          <p:cNvSpPr txBox="1"/>
+          <p:nvPr/>
+        </p:nvSpPr>
+        <p:spPr>
+          <a:xfrm>
+            <a:off x="4912242" y="5575005"/>
+            <a:ext cx="3109026" cy="646331"/>
+          </a:xfrm>
+          <a:prstGeom prst="rect">
+            <a:avLst/>
+          </a:prstGeom>
+          <a:noFill/>
+        </p:spPr>
+        <p:txBody>
+          <a:bodyPr wrap="square" rtlCol="0">
+            <a:spAutoFit/>
+          </a:bodyPr>
+          <a:lstStyle/>
+          <a:p>
+            <a:pPr algn="ctr"/>
+            <a:r>
+              <a:rPr lang="en-US" dirty="0" err="1"/>
+              <a:t>ResearchRabbit</a:t>
+            </a:r>
+            <a:r>
+              <a:rPr lang="en-US" dirty="0"/>
+              <a:t> suggested paper collection (not curated)</a:t>
+            </a:r>
+          </a:p>
+        </p:txBody>
+      </p:sp>
+    </p:spTree>
+    <p:extLst>
+      <p:ext uri="{BB962C8B-B14F-4D97-AF65-F5344CB8AC3E}">
+        <p14:creationId xmlns:p14="http://schemas.microsoft.com/office/powerpoint/2010/main" val="3948039037"/>
+      </p:ext>
+    </p:extLst>
+  </p:cSld>
+  <p:clrMapOvr>
+    <a:masterClrMapping/>
+  </p:clrMapOvr>
+</p:sld>
+</file>
+
+<file path=ppt/slides/slide5.xml><?xml version="1.0" encoding="utf-8"?>
+<p:sld xmlns:a="http://schemas.openxmlformats.org/drawingml/2006/main" xmlns:r="http://schemas.openxmlformats.org/officeDocument/2006/relationships" xmlns:p="http://schemas.openxmlformats.org/presentationml/2006/main">
+  <p:cSld>
+    <p:spTree>
+      <p:nvGrpSpPr>
+        <p:cNvPr id="1" name=""/>
+        <p:cNvGrpSpPr/>
+        <p:nvPr/>
+      </p:nvGrpSpPr>
+      <p:grpSpPr>
+        <a:xfrm>
+          <a:off x="0" y="0"/>
+          <a:ext cx="0" cy="0"/>
+          <a:chOff x="0" y="0"/>
+          <a:chExt cx="0" cy="0"/>
+        </a:xfrm>
+      </p:grpSpPr>
+      <p:sp>
+        <p:nvSpPr>
+          <p:cNvPr id="2" name="Title 1">
+            <a:extLst>
+              <a:ext uri="{FF2B5EF4-FFF2-40B4-BE49-F238E27FC236}">
+                <a16:creationId xmlns:a16="http://schemas.microsoft.com/office/drawing/2014/main" id="{319FA74B-3CE1-4A7C-A7E9-064D021F5921}"/>
+              </a:ext>
+            </a:extLst>
+          </p:cNvPr>
+          <p:cNvSpPr>
+            <a:spLocks noGrp="1"/>
+          </p:cNvSpPr>
+          <p:nvPr>
+            <p:ph type="title"/>
+          </p:nvPr>
+        </p:nvSpPr>
+        <p:spPr/>
+        <p:txBody>
+          <a:bodyPr/>
+          <a:lstStyle/>
+          <a:p>
+            <a:r>
+              <a:rPr lang="en-US" dirty="0"/>
+              <a:t>Approach: Vascular Flow (done in class)</a:t>
+            </a:r>
+          </a:p>
+        </p:txBody>
+      </p:sp>
+      <p:pic>
+        <p:nvPicPr>
+          <p:cNvPr id="4" name="Content Placeholder 3">
+            <a:extLst>
+              <a:ext uri="{FF2B5EF4-FFF2-40B4-BE49-F238E27FC236}">
+                <a16:creationId xmlns:a16="http://schemas.microsoft.com/office/drawing/2014/main" id="{BC232CD7-36BF-4B64-9324-9425BF327EC2}"/>
+              </a:ext>
+            </a:extLst>
+          </p:cNvPr>
+          <p:cNvPicPr>
+            <a:picLocks noGrp="1" noChangeAspect="1"/>
+          </p:cNvPicPr>
+          <p:nvPr>
+            <p:ph idx="1"/>
+          </p:nvPr>
+        </p:nvPicPr>
+        <p:blipFill>
+          <a:blip r:embed="rId2"/>
+          <a:stretch>
+            <a:fillRect/>
+          </a:stretch>
+        </p:blipFill>
+        <p:spPr>
+          <a:xfrm>
+            <a:off x="0" y="1321773"/>
+            <a:ext cx="4189228" cy="5536227"/>
+          </a:xfrm>
+          <a:prstGeom prst="rect">
+            <a:avLst/>
+          </a:prstGeom>
+        </p:spPr>
+      </p:pic>
+      <p:pic>
+        <p:nvPicPr>
+          <p:cNvPr id="5" name="Picture 4">
+            <a:extLst>
+              <a:ext uri="{FF2B5EF4-FFF2-40B4-BE49-F238E27FC236}">
+                <a16:creationId xmlns:a16="http://schemas.microsoft.com/office/drawing/2014/main" id="{9E3DFC2B-4D8B-404C-8F24-011EB2AF4B53}"/>
+              </a:ext>
+            </a:extLst>
+          </p:cNvPr>
+          <p:cNvPicPr>
+            <a:picLocks noChangeAspect="1"/>
+          </p:cNvPicPr>
+          <p:nvPr/>
+        </p:nvPicPr>
+        <p:blipFill>
+          <a:blip r:embed="rId3"/>
+          <a:stretch>
+            <a:fillRect/>
+          </a:stretch>
+        </p:blipFill>
+        <p:spPr>
+          <a:xfrm>
+            <a:off x="0" y="4859078"/>
+            <a:ext cx="1998921" cy="1998921"/>
+          </a:xfrm>
+          <a:prstGeom prst="rect">
+            <a:avLst/>
+          </a:prstGeom>
+        </p:spPr>
+      </p:pic>
+      <p:sp>
+        <p:nvSpPr>
+          <p:cNvPr id="6" name="TextBox 5">
+            <a:extLst>
+              <a:ext uri="{FF2B5EF4-FFF2-40B4-BE49-F238E27FC236}">
+                <a16:creationId xmlns:a16="http://schemas.microsoft.com/office/drawing/2014/main" id="{2ADEB814-1B53-4DF0-8644-D5026FD853A2}"/>
+              </a:ext>
+            </a:extLst>
+          </p:cNvPr>
+          <p:cNvSpPr txBox="1"/>
+          <p:nvPr/>
+        </p:nvSpPr>
+        <p:spPr>
+          <a:xfrm>
+            <a:off x="4720856" y="1690688"/>
+            <a:ext cx="6632944" cy="3693319"/>
+          </a:xfrm>
+          <a:prstGeom prst="rect">
+            <a:avLst/>
+          </a:prstGeom>
+          <a:noFill/>
+        </p:spPr>
+        <p:txBody>
+          <a:bodyPr wrap="square" rtlCol="0">
+            <a:spAutoFit/>
+          </a:bodyPr>
+          <a:lstStyle/>
+          <a:p>
+            <a:pPr marL="285750" indent="-285750">
+              <a:buFont typeface="Arial" panose="020B0604020202020204" pitchFamily="34" charset="0"/>
+              <a:buChar char="•"/>
+            </a:pPr>
+            <a:r>
+              <a:rPr lang="en-US" dirty="0"/>
+              <a:t>Convolutional Neural Net to upscale  x and y components of velocity, also predict a pressure field</a:t>
+            </a:r>
+          </a:p>
+          <a:p>
+            <a:pPr marL="285750" indent="-285750">
+              <a:buFont typeface="Arial" panose="020B0604020202020204" pitchFamily="34" charset="0"/>
+              <a:buChar char="•"/>
+            </a:pPr>
+            <a:r>
+              <a:rPr lang="en-US" dirty="0"/>
+              <a:t>Governing Equations: x and y momentum from 2D </a:t>
+            </a:r>
+            <a:r>
+              <a:rPr lang="en-US" dirty="0" err="1"/>
+              <a:t>Navier</a:t>
+            </a:r>
+            <a:r>
+              <a:rPr lang="en-US" dirty="0"/>
+              <a:t>-Stokes, continuity from 2D </a:t>
+            </a:r>
+            <a:r>
+              <a:rPr lang="en-US" dirty="0" err="1"/>
+              <a:t>Navier</a:t>
+            </a:r>
+            <a:r>
+              <a:rPr lang="en-US" dirty="0"/>
+              <a:t> Stokes</a:t>
+            </a:r>
+          </a:p>
+          <a:p>
+            <a:pPr marL="285750" indent="-285750">
+              <a:buFont typeface="Arial" panose="020B0604020202020204" pitchFamily="34" charset="0"/>
+              <a:buChar char="•"/>
+            </a:pPr>
+            <a:r>
+              <a:rPr lang="en-US" dirty="0"/>
+              <a:t>Incorrect pressure field</a:t>
+            </a:r>
+          </a:p>
+          <a:p>
+            <a:pPr marL="742950" lvl="1" indent="-285750">
+              <a:buFont typeface="Arial" panose="020B0604020202020204" pitchFamily="34" charset="0"/>
+              <a:buChar char="•"/>
+            </a:pPr>
+            <a:r>
+              <a:rPr lang="en-US" dirty="0"/>
+              <a:t>“The current framework cannot accurately recover the hidden pressure field because of the implicit coupling of pressure and velocity (i.e., the pressure appears as a source term in the momentum equations). The governing equation needs to be reformulated to strongly couple the pressure and velocity predictions based on, e.g., elliptic equation of pressure </a:t>
+            </a:r>
+            <a:r>
+              <a:rPr lang="en-US" dirty="0">
+                <a:hlinkClick r:id="rId4"/>
+              </a:rPr>
+              <a:t>81</a:t>
+            </a:r>
+            <a:r>
+              <a:rPr lang="en-US" dirty="0"/>
+              <a:t> and </a:t>
+            </a:r>
+            <a:r>
+              <a:rPr lang="en-US" dirty="0" err="1"/>
+              <a:t>Rhie</a:t>
+            </a:r>
+            <a:r>
+              <a:rPr lang="en-US" dirty="0"/>
+              <a:t>–Chow interpolation.</a:t>
+            </a:r>
+            <a:r>
+              <a:rPr lang="en-US" dirty="0">
+                <a:hlinkClick r:id="rId5"/>
+              </a:rPr>
+              <a:t>75</a:t>
+            </a:r>
+            <a:r>
+              <a:rPr lang="en-US" dirty="0"/>
+              <a:t>”</a:t>
+            </a:r>
+          </a:p>
+          <a:p>
+            <a:pPr marL="742950" lvl="1" indent="-285750">
+              <a:buFont typeface="Arial" panose="020B0604020202020204" pitchFamily="34" charset="0"/>
+              <a:buChar char="•"/>
+            </a:pPr>
+            <a:endParaRPr lang="en-US" dirty="0"/>
+          </a:p>
+        </p:txBody>
+      </p:sp>
+    </p:spTree>
+    <p:extLst>
+      <p:ext uri="{BB962C8B-B14F-4D97-AF65-F5344CB8AC3E}">
+        <p14:creationId xmlns:p14="http://schemas.microsoft.com/office/powerpoint/2010/main" val="1595711932"/>
+      </p:ext>
+    </p:extLst>
+  </p:cSld>
+  <p:clrMapOvr>
+    <a:masterClrMapping/>
+  </p:clrMapOvr>
+</p:sld>
+</file>
+
+<file path=ppt/slides/slide6.xml><?xml version="1.0" encoding="utf-8"?>
+<p:sld xmlns:a="http://schemas.openxmlformats.org/drawingml/2006/main" xmlns:r="http://schemas.openxmlformats.org/officeDocument/2006/relationships" xmlns:p="http://schemas.openxmlformats.org/presentationml/2006/main">
+  <p:cSld>
+    <p:spTree>
+      <p:nvGrpSpPr>
+        <p:cNvPr id="1" name=""/>
+        <p:cNvGrpSpPr/>
+        <p:nvPr/>
+      </p:nvGrpSpPr>
+      <p:grpSpPr>
+        <a:xfrm>
+          <a:off x="0" y="0"/>
+          <a:ext cx="0" cy="0"/>
+          <a:chOff x="0" y="0"/>
+          <a:chExt cx="0" cy="0"/>
+        </a:xfrm>
+      </p:grpSpPr>
+      <p:sp>
+        <p:nvSpPr>
+          <p:cNvPr id="2" name="Title 1">
+            <a:extLst>
+              <a:ext uri="{FF2B5EF4-FFF2-40B4-BE49-F238E27FC236}">
+                <a16:creationId xmlns:a16="http://schemas.microsoft.com/office/drawing/2014/main" id="{93047FED-3A13-9BD2-C802-8D8C7F5C8F6F}"/>
+              </a:ext>
+            </a:extLst>
+          </p:cNvPr>
+          <p:cNvSpPr>
+            <a:spLocks noGrp="1"/>
+          </p:cNvSpPr>
+          <p:nvPr>
+            <p:ph type="title"/>
+          </p:nvPr>
+        </p:nvSpPr>
+        <p:spPr/>
+        <p:txBody>
+          <a:bodyPr/>
+          <a:lstStyle/>
+          <a:p>
+            <a:r>
+              <a:rPr lang="en-US" dirty="0"/>
+              <a:t>Methods</a:t>
+            </a:r>
+          </a:p>
+        </p:txBody>
+      </p:sp>
+      <p:sp>
+        <p:nvSpPr>
+          <p:cNvPr id="3" name="Content Placeholder 2">
+            <a:extLst>
+              <a:ext uri="{FF2B5EF4-FFF2-40B4-BE49-F238E27FC236}">
+                <a16:creationId xmlns:a16="http://schemas.microsoft.com/office/drawing/2014/main" id="{7F36BA33-4B95-D10D-D863-C44C04E95B3A}"/>
+              </a:ext>
+            </a:extLst>
+          </p:cNvPr>
+          <p:cNvSpPr>
+            <a:spLocks noGrp="1"/>
+          </p:cNvSpPr>
+          <p:nvPr>
+            <p:ph idx="1"/>
+          </p:nvPr>
+        </p:nvSpPr>
+        <p:spPr/>
+        <p:txBody>
+          <a:bodyPr/>
+          <a:lstStyle/>
+          <a:p>
+            <a:r>
+              <a:rPr lang="en-US" b="0" i="0" dirty="0">
+                <a:solidFill>
+                  <a:srgbClr val="515151"/>
+                </a:solidFill>
+                <a:effectLst/>
+                <a:latin typeface="Palatino Linotype" panose="02040502050505030304" pitchFamily="18" charset="0"/>
+              </a:rPr>
+              <a:t>Uses appropriate methods and best practices. Explains approach with technical rigor (e.g., model architecture, loss functions, training details).</a:t>
+            </a:r>
+            <a:endParaRPr lang="en-US" dirty="0"/>
+          </a:p>
+        </p:txBody>
+      </p:sp>
+    </p:spTree>
+    <p:extLst>
+      <p:ext uri="{BB962C8B-B14F-4D97-AF65-F5344CB8AC3E}">
+        <p14:creationId xmlns:p14="http://schemas.microsoft.com/office/powerpoint/2010/main" val="2047516186"/>
+      </p:ext>
+    </p:extLst>
+  </p:cSld>
+  <p:clrMapOvr>
+    <a:masterClrMapping/>
+  </p:clrMapOvr>
+</p:sld>
+</file>
+
+<file path=ppt/slides/slide7.xml><?xml version="1.0" encoding="utf-8"?>
+<p:sld xmlns:a="http://schemas.openxmlformats.org/drawingml/2006/main" xmlns:r="http://schemas.openxmlformats.org/officeDocument/2006/relationships" xmlns:p="http://schemas.openxmlformats.org/presentationml/2006/main">
+  <p:cSld>
+    <p:spTree>
+      <p:nvGrpSpPr>
+        <p:cNvPr id="1" name=""/>
+        <p:cNvGrpSpPr/>
+        <p:nvPr/>
+      </p:nvGrpSpPr>
+      <p:grpSpPr>
+        <a:xfrm>
+          <a:off x="0" y="0"/>
+          <a:ext cx="0" cy="0"/>
+          <a:chOff x="0" y="0"/>
+          <a:chExt cx="0" cy="0"/>
+        </a:xfrm>
+      </p:grpSpPr>
+      <p:sp>
+        <p:nvSpPr>
+          <p:cNvPr id="2" name="Title 1">
+            <a:extLst>
+              <a:ext uri="{FF2B5EF4-FFF2-40B4-BE49-F238E27FC236}">
+                <a16:creationId xmlns:a16="http://schemas.microsoft.com/office/drawing/2014/main" id="{B83995BA-E566-4866-ACC4-0B76454CF8B9}"/>
+              </a:ext>
+            </a:extLst>
+          </p:cNvPr>
+          <p:cNvSpPr>
+            <a:spLocks noGrp="1"/>
+          </p:cNvSpPr>
+          <p:nvPr>
+            <p:ph type="title"/>
+          </p:nvPr>
+        </p:nvSpPr>
+        <p:spPr/>
+        <p:txBody>
+          <a:bodyPr/>
+          <a:lstStyle/>
+          <a:p>
+            <a:r>
+              <a:rPr lang="en-US" dirty="0"/>
+              <a:t>Methods</a:t>
+            </a:r>
+          </a:p>
+        </p:txBody>
+      </p:sp>
+      <p:sp>
+        <p:nvSpPr>
+          <p:cNvPr id="3" name="Content Placeholder 2">
+            <a:extLst>
+              <a:ext uri="{FF2B5EF4-FFF2-40B4-BE49-F238E27FC236}">
+                <a16:creationId xmlns:a16="http://schemas.microsoft.com/office/drawing/2014/main" id="{60716DB1-954E-402F-A291-493F931D7E1A}"/>
+              </a:ext>
+            </a:extLst>
+          </p:cNvPr>
+          <p:cNvSpPr>
+            <a:spLocks noGrp="1"/>
+          </p:cNvSpPr>
+          <p:nvPr>
+            <p:ph idx="1"/>
+          </p:nvPr>
+        </p:nvSpPr>
+        <p:spPr/>
+        <p:txBody>
+          <a:bodyPr/>
+          <a:lstStyle/>
+          <a:p>
+            <a:r>
+              <a:rPr lang="en-US" dirty="0"/>
+              <a:t>Convolutional Neural Net: Good for spatially correlated data (flow fields)</a:t>
+            </a:r>
+          </a:p>
+          <a:p>
+            <a:pPr lvl="1"/>
+            <a:r>
+              <a:rPr lang="en-US" dirty="0"/>
+              <a:t>Activation Function: </a:t>
+            </a:r>
+            <a:r>
+              <a:rPr lang="en-US" dirty="0" err="1"/>
+              <a:t>ReLU</a:t>
+            </a:r>
+            <a:endParaRPr lang="en-US" dirty="0"/>
+          </a:p>
+          <a:p>
+            <a:pPr lvl="1"/>
+            <a:r>
+              <a:rPr lang="en-US" dirty="0"/>
+              <a:t>Layer Channels: 2 (input) -&gt; 16 -&gt; 32 -&gt; 64 -&gt; 32 -&gt; 3 (output)</a:t>
+            </a:r>
+          </a:p>
+          <a:p>
+            <a:pPr lvl="1"/>
+            <a:r>
+              <a:rPr lang="en-US" dirty="0"/>
+              <a:t>Kernel Size: 5x5</a:t>
+            </a:r>
+          </a:p>
+          <a:p>
+            <a:pPr lvl="1"/>
+            <a:r>
+              <a:rPr lang="en-US" dirty="0"/>
+              <a:t>Padding: 2</a:t>
+            </a:r>
+          </a:p>
+          <a:p>
+            <a:pPr lvl="1"/>
+            <a:r>
+              <a:rPr lang="en-US" dirty="0"/>
+              <a:t>Learning Rate: 1e-3, or 1e-4</a:t>
+            </a:r>
+          </a:p>
+          <a:p>
+            <a:endParaRPr lang="en-US" dirty="0"/>
+          </a:p>
+          <a:p>
+            <a:r>
+              <a:rPr lang="en-US"/>
+              <a:t>Modified</a:t>
+            </a:r>
+            <a:endParaRPr lang="en-US" dirty="0"/>
+          </a:p>
+          <a:p>
+            <a:pPr marL="457200" lvl="1" indent="0">
+              <a:buNone/>
+            </a:pPr>
+            <a:endParaRPr lang="en-US" dirty="0"/>
+          </a:p>
+        </p:txBody>
+      </p:sp>
+    </p:spTree>
+    <p:extLst>
+      <p:ext uri="{BB962C8B-B14F-4D97-AF65-F5344CB8AC3E}">
+        <p14:creationId xmlns:p14="http://schemas.microsoft.com/office/powerpoint/2010/main" val="2693186965"/>
+      </p:ext>
+    </p:extLst>
+  </p:cSld>
+  <p:clrMapOvr>
+    <a:masterClrMapping/>
+  </p:clrMapOvr>
+</p:sld>
+</file>
+
+<file path=ppt/slides/slide8.xml><?xml version="1.0" encoding="utf-8"?>
+<p:sld xmlns:a="http://schemas.openxmlformats.org/drawingml/2006/main" xmlns:r="http://schemas.openxmlformats.org/officeDocument/2006/relationships" xmlns:p="http://schemas.openxmlformats.org/presentationml/2006/main">
+  <p:cSld>
+    <p:spTree>
+      <p:nvGrpSpPr>
+        <p:cNvPr id="1" name=""/>
+        <p:cNvGrpSpPr/>
+        <p:nvPr/>
+      </p:nvGrpSpPr>
+      <p:grpSpPr>
+        <a:xfrm>
+          <a:off x="0" y="0"/>
+          <a:ext cx="0" cy="0"/>
+          <a:chOff x="0" y="0"/>
+          <a:chExt cx="0" cy="0"/>
+        </a:xfrm>
+      </p:grpSpPr>
+      <p:sp>
+        <p:nvSpPr>
+          <p:cNvPr id="2" name="Title 1">
+            <a:extLst>
+              <a:ext uri="{FF2B5EF4-FFF2-40B4-BE49-F238E27FC236}">
                 <a16:creationId xmlns:a16="http://schemas.microsoft.com/office/drawing/2014/main" id="{E317AC35-F748-C408-144E-7B4FF4BCD495}"/>
               </a:ext>
             </a:extLst>
@@ -3819,7 +4647,7 @@
 </p:sld>
 </file>
 
-<file path=ppt/slides/slide5.xml><?xml version="1.0" encoding="utf-8"?>
+<file path=ppt/slides/slide9.xml><?xml version="1.0" encoding="utf-8"?>
 <p:sld xmlns:a="http://schemas.openxmlformats.org/drawingml/2006/main" xmlns:r="http://schemas.openxmlformats.org/officeDocument/2006/relationships" xmlns:p="http://schemas.openxmlformats.org/presentationml/2006/main">
   <p:cSld>
     <p:spTree>

</xml_diff>